<commit_message>
Add possibility to delete points
</commit_message>
<xml_diff>
--- a/prog_dev_help/pac-tool help draw.pptx
+++ b/prog_dev_help/pac-tool help draw.pptx
@@ -42,6 +42,8 @@
     <p:sldId id="284" r:id="rId36"/>
     <p:sldId id="320" r:id="rId37"/>
     <p:sldId id="321" r:id="rId38"/>
+    <p:sldId id="322" r:id="rId39"/>
+    <p:sldId id="323" r:id="rId40"/>
   </p:sldIdLst>
   <p:sldSz cx="9144000" cy="6858000" type="screen4x3"/>
   <p:notesSz cx="6858000" cy="9144000"/>
@@ -324,7 +326,7 @@
           <a:p>
             <a:fld id="{42968C2D-30BC-42AA-92C6-446775E33AE6}" type="datetimeFigureOut">
               <a:rPr lang="fr-FR" smtClean="0"/>
-              <a:t>04/01/2017</a:t>
+              <a:t>12/01/2017</a:t>
             </a:fld>
             <a:endParaRPr lang="fr-FR"/>
           </a:p>
@@ -494,7 +496,7 @@
           <a:p>
             <a:fld id="{42968C2D-30BC-42AA-92C6-446775E33AE6}" type="datetimeFigureOut">
               <a:rPr lang="fr-FR" smtClean="0"/>
-              <a:t>04/01/2017</a:t>
+              <a:t>12/01/2017</a:t>
             </a:fld>
             <a:endParaRPr lang="fr-FR"/>
           </a:p>
@@ -674,7 +676,7 @@
           <a:p>
             <a:fld id="{42968C2D-30BC-42AA-92C6-446775E33AE6}" type="datetimeFigureOut">
               <a:rPr lang="fr-FR" smtClean="0"/>
-              <a:t>04/01/2017</a:t>
+              <a:t>12/01/2017</a:t>
             </a:fld>
             <a:endParaRPr lang="fr-FR"/>
           </a:p>
@@ -844,7 +846,7 @@
           <a:p>
             <a:fld id="{42968C2D-30BC-42AA-92C6-446775E33AE6}" type="datetimeFigureOut">
               <a:rPr lang="fr-FR" smtClean="0"/>
-              <a:t>04/01/2017</a:t>
+              <a:t>12/01/2017</a:t>
             </a:fld>
             <a:endParaRPr lang="fr-FR"/>
           </a:p>
@@ -1090,7 +1092,7 @@
           <a:p>
             <a:fld id="{42968C2D-30BC-42AA-92C6-446775E33AE6}" type="datetimeFigureOut">
               <a:rPr lang="fr-FR" smtClean="0"/>
-              <a:t>04/01/2017</a:t>
+              <a:t>12/01/2017</a:t>
             </a:fld>
             <a:endParaRPr lang="fr-FR"/>
           </a:p>
@@ -1378,7 +1380,7 @@
           <a:p>
             <a:fld id="{42968C2D-30BC-42AA-92C6-446775E33AE6}" type="datetimeFigureOut">
               <a:rPr lang="fr-FR" smtClean="0"/>
-              <a:t>04/01/2017</a:t>
+              <a:t>12/01/2017</a:t>
             </a:fld>
             <a:endParaRPr lang="fr-FR"/>
           </a:p>
@@ -1800,7 +1802,7 @@
           <a:p>
             <a:fld id="{42968C2D-30BC-42AA-92C6-446775E33AE6}" type="datetimeFigureOut">
               <a:rPr lang="fr-FR" smtClean="0"/>
-              <a:t>04/01/2017</a:t>
+              <a:t>12/01/2017</a:t>
             </a:fld>
             <a:endParaRPr lang="fr-FR"/>
           </a:p>
@@ -1918,7 +1920,7 @@
           <a:p>
             <a:fld id="{42968C2D-30BC-42AA-92C6-446775E33AE6}" type="datetimeFigureOut">
               <a:rPr lang="fr-FR" smtClean="0"/>
-              <a:t>04/01/2017</a:t>
+              <a:t>12/01/2017</a:t>
             </a:fld>
             <a:endParaRPr lang="fr-FR"/>
           </a:p>
@@ -2013,7 +2015,7 @@
           <a:p>
             <a:fld id="{42968C2D-30BC-42AA-92C6-446775E33AE6}" type="datetimeFigureOut">
               <a:rPr lang="fr-FR" smtClean="0"/>
-              <a:t>04/01/2017</a:t>
+              <a:t>12/01/2017</a:t>
             </a:fld>
             <a:endParaRPr lang="fr-FR"/>
           </a:p>
@@ -2290,7 +2292,7 @@
           <a:p>
             <a:fld id="{42968C2D-30BC-42AA-92C6-446775E33AE6}" type="datetimeFigureOut">
               <a:rPr lang="fr-FR" smtClean="0"/>
-              <a:t>04/01/2017</a:t>
+              <a:t>12/01/2017</a:t>
             </a:fld>
             <a:endParaRPr lang="fr-FR"/>
           </a:p>
@@ -2543,7 +2545,7 @@
           <a:p>
             <a:fld id="{42968C2D-30BC-42AA-92C6-446775E33AE6}" type="datetimeFigureOut">
               <a:rPr lang="fr-FR" smtClean="0"/>
-              <a:t>04/01/2017</a:t>
+              <a:t>12/01/2017</a:t>
             </a:fld>
             <a:endParaRPr lang="fr-FR"/>
           </a:p>
@@ -2756,7 +2758,7 @@
           <a:p>
             <a:fld id="{42968C2D-30BC-42AA-92C6-446775E33AE6}" type="datetimeFigureOut">
               <a:rPr lang="fr-FR" smtClean="0"/>
-              <a:t>04/01/2017</a:t>
+              <a:t>12/01/2017</a:t>
             </a:fld>
             <a:endParaRPr lang="fr-FR"/>
           </a:p>
@@ -23454,6 +23456,555 @@
 </p:sld>
 </file>
 
+<file path=ppt/slides/slide38.xml><?xml version="1.0" encoding="utf-8"?>
+<p:sld xmlns:a="http://schemas.openxmlformats.org/drawingml/2006/main" xmlns:r="http://schemas.openxmlformats.org/officeDocument/2006/relationships" xmlns:p="http://schemas.openxmlformats.org/presentationml/2006/main">
+  <p:cSld>
+    <p:spTree>
+      <p:nvGrpSpPr>
+        <p:cNvPr id="1" name=""/>
+        <p:cNvGrpSpPr/>
+        <p:nvPr/>
+      </p:nvGrpSpPr>
+      <p:grpSpPr>
+        <a:xfrm>
+          <a:off x="0" y="0"/>
+          <a:ext cx="0" cy="0"/>
+          <a:chOff x="0" y="0"/>
+          <a:chExt cx="0" cy="0"/>
+        </a:xfrm>
+      </p:grpSpPr>
+      <p:sp>
+        <p:nvSpPr>
+          <p:cNvPr id="2" name="ZoneTexte 1"/>
+          <p:cNvSpPr txBox="1"/>
+          <p:nvPr/>
+        </p:nvSpPr>
+        <p:spPr>
+          <a:xfrm>
+            <a:off x="2593724" y="2016422"/>
+            <a:ext cx="4375300" cy="646331"/>
+          </a:xfrm>
+          <a:prstGeom prst="rect">
+            <a:avLst/>
+          </a:prstGeom>
+          <a:noFill/>
+        </p:spPr>
+        <p:txBody>
+          <a:bodyPr wrap="none" rtlCol="0">
+            <a:spAutoFit/>
+          </a:bodyPr>
+          <a:lstStyle/>
+          <a:p>
+            <a:pPr algn="ctr"/>
+            <a:r>
+              <a:rPr lang="fr-FR" dirty="0"/>
+              <a:t>POPUP Menu</a:t>
+            </a:r>
+            <a:endParaRPr lang="en-US" dirty="0" smtClean="0"/>
+          </a:p>
+          <a:p>
+            <a:pPr algn="ctr"/>
+            <a:r>
+              <a:rPr lang="en-US" dirty="0" smtClean="0"/>
+              <a:t>Will </a:t>
+            </a:r>
+            <a:r>
+              <a:rPr lang="en-US" dirty="0"/>
+              <a:t>return the nearest element id of </a:t>
+            </a:r>
+            <a:r>
+              <a:rPr lang="en-US" dirty="0" err="1" smtClean="0"/>
+              <a:t>elDraw</a:t>
+            </a:r>
+            <a:endParaRPr lang="fr-FR" dirty="0"/>
+          </a:p>
+        </p:txBody>
+      </p:sp>
+    </p:spTree>
+    <p:extLst>
+      <p:ext uri="{BB962C8B-B14F-4D97-AF65-F5344CB8AC3E}">
+        <p14:creationId xmlns:p14="http://schemas.microsoft.com/office/powerpoint/2010/main" val="913773380"/>
+      </p:ext>
+    </p:extLst>
+  </p:cSld>
+  <p:clrMapOvr>
+    <a:masterClrMapping/>
+  </p:clrMapOvr>
+</p:sld>
+</file>
+
+<file path=ppt/slides/slide39.xml><?xml version="1.0" encoding="utf-8"?>
+<p:sld xmlns:a="http://schemas.openxmlformats.org/drawingml/2006/main" xmlns:r="http://schemas.openxmlformats.org/officeDocument/2006/relationships" xmlns:p="http://schemas.openxmlformats.org/presentationml/2006/main">
+  <p:cSld>
+    <p:spTree>
+      <p:nvGrpSpPr>
+        <p:cNvPr id="1" name=""/>
+        <p:cNvGrpSpPr/>
+        <p:nvPr/>
+      </p:nvGrpSpPr>
+      <p:grpSpPr>
+        <a:xfrm>
+          <a:off x="0" y="0"/>
+          <a:ext cx="0" cy="0"/>
+          <a:chOff x="0" y="0"/>
+          <a:chExt cx="0" cy="0"/>
+        </a:xfrm>
+      </p:grpSpPr>
+      <p:sp>
+        <p:nvSpPr>
+          <p:cNvPr id="5" name="Ellipse 4"/>
+          <p:cNvSpPr/>
+          <p:nvPr/>
+        </p:nvSpPr>
+        <p:spPr>
+          <a:xfrm>
+            <a:off x="4067944" y="2852936"/>
+            <a:ext cx="216024" cy="216024"/>
+          </a:xfrm>
+          <a:prstGeom prst="ellipse">
+            <a:avLst/>
+          </a:prstGeom>
+        </p:spPr>
+        <p:style>
+          <a:lnRef idx="0">
+            <a:schemeClr val="accent2"/>
+          </a:lnRef>
+          <a:fillRef idx="3">
+            <a:schemeClr val="accent2"/>
+          </a:fillRef>
+          <a:effectRef idx="3">
+            <a:schemeClr val="accent2"/>
+          </a:effectRef>
+          <a:fontRef idx="minor">
+            <a:schemeClr val="lt1"/>
+          </a:fontRef>
+        </p:style>
+        <p:txBody>
+          <a:bodyPr rtlCol="0" anchor="ctr"/>
+          <a:lstStyle/>
+          <a:p>
+            <a:pPr algn="ctr"/>
+            <a:endParaRPr lang="fr-FR"/>
+          </a:p>
+        </p:txBody>
+      </p:sp>
+      <p:sp>
+        <p:nvSpPr>
+          <p:cNvPr id="6" name="ZoneTexte 5"/>
+          <p:cNvSpPr txBox="1"/>
+          <p:nvPr/>
+        </p:nvSpPr>
+        <p:spPr>
+          <a:xfrm>
+            <a:off x="4011488" y="3172326"/>
+            <a:ext cx="328936" cy="369332"/>
+          </a:xfrm>
+          <a:prstGeom prst="rect">
+            <a:avLst/>
+          </a:prstGeom>
+          <a:noFill/>
+        </p:spPr>
+        <p:txBody>
+          <a:bodyPr wrap="none" rtlCol="0">
+            <a:spAutoFit/>
+          </a:bodyPr>
+          <a:lstStyle/>
+          <a:p>
+            <a:r>
+              <a:rPr lang="fr-FR" dirty="0" smtClean="0"/>
+              <a:t>H</a:t>
+            </a:r>
+            <a:endParaRPr lang="fr-FR" dirty="0"/>
+          </a:p>
+        </p:txBody>
+      </p:sp>
+      <p:sp>
+        <p:nvSpPr>
+          <p:cNvPr id="7" name="Ellipse 6"/>
+          <p:cNvSpPr/>
+          <p:nvPr/>
+        </p:nvSpPr>
+        <p:spPr>
+          <a:xfrm>
+            <a:off x="5148064" y="3541658"/>
+            <a:ext cx="216024" cy="247382"/>
+          </a:xfrm>
+          <a:prstGeom prst="ellipse">
+            <a:avLst/>
+          </a:prstGeom>
+        </p:spPr>
+        <p:style>
+          <a:lnRef idx="2">
+            <a:schemeClr val="accent1">
+              <a:shade val="50000"/>
+            </a:schemeClr>
+          </a:lnRef>
+          <a:fillRef idx="1">
+            <a:schemeClr val="accent1"/>
+          </a:fillRef>
+          <a:effectRef idx="0">
+            <a:schemeClr val="accent1"/>
+          </a:effectRef>
+          <a:fontRef idx="minor">
+            <a:schemeClr val="lt1"/>
+          </a:fontRef>
+        </p:style>
+        <p:txBody>
+          <a:bodyPr rtlCol="0" anchor="ctr"/>
+          <a:lstStyle/>
+          <a:p>
+            <a:pPr algn="ctr"/>
+            <a:endParaRPr lang="fr-FR"/>
+          </a:p>
+        </p:txBody>
+      </p:sp>
+      <p:sp>
+        <p:nvSpPr>
+          <p:cNvPr id="8" name="ZoneTexte 7"/>
+          <p:cNvSpPr txBox="1"/>
+          <p:nvPr/>
+        </p:nvSpPr>
+        <p:spPr>
+          <a:xfrm>
+            <a:off x="4871146" y="4005064"/>
+            <a:ext cx="822148" cy="369332"/>
+          </a:xfrm>
+          <a:prstGeom prst="rect">
+            <a:avLst/>
+          </a:prstGeom>
+          <a:noFill/>
+        </p:spPr>
+        <p:txBody>
+          <a:bodyPr wrap="none" rtlCol="0">
+            <a:spAutoFit/>
+          </a:bodyPr>
+          <a:lstStyle/>
+          <a:p>
+            <a:r>
+              <a:rPr lang="fr-FR" dirty="0" err="1" smtClean="0"/>
+              <a:t>pointH</a:t>
+            </a:r>
+            <a:endParaRPr lang="fr-FR" dirty="0"/>
+          </a:p>
+        </p:txBody>
+      </p:sp>
+      <p:sp>
+        <p:nvSpPr>
+          <p:cNvPr id="9" name="Rectangle 8"/>
+          <p:cNvSpPr/>
+          <p:nvPr/>
+        </p:nvSpPr>
+        <p:spPr>
+          <a:xfrm>
+            <a:off x="2843808" y="2060848"/>
+            <a:ext cx="2736304" cy="1944216"/>
+          </a:xfrm>
+          <a:prstGeom prst="rect">
+            <a:avLst/>
+          </a:prstGeom>
+          <a:solidFill>
+            <a:schemeClr val="accent3">
+              <a:alpha val="33000"/>
+            </a:schemeClr>
+          </a:solidFill>
+        </p:spPr>
+        <p:style>
+          <a:lnRef idx="2">
+            <a:schemeClr val="accent3">
+              <a:shade val="50000"/>
+            </a:schemeClr>
+          </a:lnRef>
+          <a:fillRef idx="1">
+            <a:schemeClr val="accent3"/>
+          </a:fillRef>
+          <a:effectRef idx="0">
+            <a:schemeClr val="accent3"/>
+          </a:effectRef>
+          <a:fontRef idx="minor">
+            <a:schemeClr val="lt1"/>
+          </a:fontRef>
+        </p:style>
+        <p:txBody>
+          <a:bodyPr rtlCol="0" anchor="ctr"/>
+          <a:lstStyle/>
+          <a:p>
+            <a:pPr algn="ctr"/>
+            <a:endParaRPr lang="fr-FR"/>
+          </a:p>
+        </p:txBody>
+      </p:sp>
+      <p:sp>
+        <p:nvSpPr>
+          <p:cNvPr id="10" name="ZoneTexte 9"/>
+          <p:cNvSpPr txBox="1"/>
+          <p:nvPr/>
+        </p:nvSpPr>
+        <p:spPr>
+          <a:xfrm>
+            <a:off x="4549825" y="1504216"/>
+            <a:ext cx="774315" cy="369332"/>
+          </a:xfrm>
+          <a:prstGeom prst="rect">
+            <a:avLst/>
+          </a:prstGeom>
+          <a:noFill/>
+        </p:spPr>
+        <p:txBody>
+          <a:bodyPr wrap="none" rtlCol="0">
+            <a:spAutoFit/>
+          </a:bodyPr>
+          <a:lstStyle/>
+          <a:p>
+            <a:r>
+              <a:rPr lang="fr-FR" dirty="0" err="1" smtClean="0"/>
+              <a:t>zoneH</a:t>
+            </a:r>
+            <a:endParaRPr lang="fr-FR" dirty="0"/>
+          </a:p>
+        </p:txBody>
+      </p:sp>
+      <p:cxnSp>
+        <p:nvCxnSpPr>
+          <p:cNvPr id="12" name="Connecteur droit avec flèche 11"/>
+          <p:cNvCxnSpPr/>
+          <p:nvPr/>
+        </p:nvCxnSpPr>
+        <p:spPr>
+          <a:xfrm>
+            <a:off x="4211960" y="1873548"/>
+            <a:ext cx="1368152" cy="0"/>
+          </a:xfrm>
+          <a:prstGeom prst="straightConnector1">
+            <a:avLst/>
+          </a:prstGeom>
+          <a:ln>
+            <a:headEnd type="arrow"/>
+            <a:tailEnd type="arrow"/>
+          </a:ln>
+        </p:spPr>
+        <p:style>
+          <a:lnRef idx="1">
+            <a:schemeClr val="accent1"/>
+          </a:lnRef>
+          <a:fillRef idx="0">
+            <a:schemeClr val="accent1"/>
+          </a:fillRef>
+          <a:effectRef idx="0">
+            <a:schemeClr val="accent1"/>
+          </a:effectRef>
+          <a:fontRef idx="minor">
+            <a:schemeClr val="tx1"/>
+          </a:fontRef>
+        </p:style>
+      </p:cxnSp>
+      <p:sp>
+        <p:nvSpPr>
+          <p:cNvPr id="17" name="ZoneTexte 16"/>
+          <p:cNvSpPr txBox="1"/>
+          <p:nvPr/>
+        </p:nvSpPr>
+        <p:spPr>
+          <a:xfrm>
+            <a:off x="3145669" y="1507664"/>
+            <a:ext cx="774315" cy="369332"/>
+          </a:xfrm>
+          <a:prstGeom prst="rect">
+            <a:avLst/>
+          </a:prstGeom>
+          <a:noFill/>
+        </p:spPr>
+        <p:txBody>
+          <a:bodyPr wrap="none" rtlCol="0">
+            <a:spAutoFit/>
+          </a:bodyPr>
+          <a:lstStyle/>
+          <a:p>
+            <a:r>
+              <a:rPr lang="fr-FR" dirty="0" err="1" smtClean="0"/>
+              <a:t>zoneH</a:t>
+            </a:r>
+            <a:endParaRPr lang="fr-FR" dirty="0"/>
+          </a:p>
+        </p:txBody>
+      </p:sp>
+      <p:cxnSp>
+        <p:nvCxnSpPr>
+          <p:cNvPr id="18" name="Connecteur droit avec flèche 17"/>
+          <p:cNvCxnSpPr/>
+          <p:nvPr/>
+        </p:nvCxnSpPr>
+        <p:spPr>
+          <a:xfrm>
+            <a:off x="2807804" y="1876996"/>
+            <a:ext cx="1368152" cy="0"/>
+          </a:xfrm>
+          <a:prstGeom prst="straightConnector1">
+            <a:avLst/>
+          </a:prstGeom>
+          <a:ln>
+            <a:headEnd type="arrow"/>
+            <a:tailEnd type="arrow"/>
+          </a:ln>
+        </p:spPr>
+        <p:style>
+          <a:lnRef idx="1">
+            <a:schemeClr val="accent1"/>
+          </a:lnRef>
+          <a:fillRef idx="0">
+            <a:schemeClr val="accent1"/>
+          </a:fillRef>
+          <a:effectRef idx="0">
+            <a:schemeClr val="accent1"/>
+          </a:effectRef>
+          <a:fontRef idx="minor">
+            <a:schemeClr val="tx1"/>
+          </a:fontRef>
+        </p:style>
+      </p:cxnSp>
+      <p:sp>
+        <p:nvSpPr>
+          <p:cNvPr id="19" name="ZoneTexte 18"/>
+          <p:cNvSpPr txBox="1"/>
+          <p:nvPr/>
+        </p:nvSpPr>
+        <p:spPr>
+          <a:xfrm>
+            <a:off x="1547664" y="5013176"/>
+            <a:ext cx="5400600" cy="1477328"/>
+          </a:xfrm>
+          <a:prstGeom prst="rect">
+            <a:avLst/>
+          </a:prstGeom>
+          <a:noFill/>
+        </p:spPr>
+        <p:txBody>
+          <a:bodyPr wrap="square" rtlCol="0">
+            <a:spAutoFit/>
+          </a:bodyPr>
+          <a:lstStyle/>
+          <a:p>
+            <a:r>
+              <a:rPr lang="fr-FR" dirty="0" smtClean="0"/>
+              <a:t>The </a:t>
+            </a:r>
+            <a:r>
+              <a:rPr lang="fr-FR" dirty="0" err="1" smtClean="0"/>
+              <a:t>function</a:t>
+            </a:r>
+            <a:r>
+              <a:rPr lang="fr-FR" dirty="0" smtClean="0"/>
+              <a:t> </a:t>
+            </a:r>
+            <a:r>
+              <a:rPr lang="fr-FR" dirty="0" err="1" smtClean="0"/>
+              <a:t>will</a:t>
+            </a:r>
+            <a:r>
+              <a:rPr lang="fr-FR" dirty="0" smtClean="0"/>
+              <a:t> </a:t>
+            </a:r>
+            <a:r>
+              <a:rPr lang="fr-FR" dirty="0" err="1" smtClean="0"/>
+              <a:t>receive</a:t>
+            </a:r>
+            <a:r>
+              <a:rPr lang="fr-FR" dirty="0" smtClean="0"/>
+              <a:t> Pressure,</a:t>
+            </a:r>
+          </a:p>
+          <a:p>
+            <a:r>
+              <a:rPr lang="fr-FR" dirty="0" smtClean="0"/>
+              <a:t>The </a:t>
+            </a:r>
+            <a:r>
+              <a:rPr lang="fr-FR" dirty="0" err="1" smtClean="0"/>
+              <a:t>eDrawL</a:t>
+            </a:r>
+            <a:r>
+              <a:rPr lang="fr-FR" dirty="0" smtClean="0"/>
+              <a:t> </a:t>
+            </a:r>
+            <a:r>
+              <a:rPr lang="fr-FR" dirty="0" err="1" smtClean="0"/>
+              <a:t>list</a:t>
+            </a:r>
+            <a:r>
+              <a:rPr lang="fr-FR" dirty="0" smtClean="0"/>
+              <a:t> </a:t>
+            </a:r>
+            <a:r>
+              <a:rPr lang="fr-FR" dirty="0" err="1" smtClean="0"/>
+              <a:t>is</a:t>
+            </a:r>
+            <a:r>
+              <a:rPr lang="fr-FR" dirty="0" smtClean="0"/>
+              <a:t> </a:t>
+            </a:r>
+            <a:r>
+              <a:rPr lang="fr-FR" dirty="0" err="1" smtClean="0"/>
+              <a:t>containing</a:t>
+            </a:r>
+            <a:r>
+              <a:rPr lang="fr-FR" dirty="0" smtClean="0"/>
+              <a:t> the Log10(Pressure)</a:t>
+            </a:r>
+          </a:p>
+          <a:p>
+            <a:endParaRPr lang="fr-FR" dirty="0"/>
+          </a:p>
+          <a:p>
+            <a:r>
+              <a:rPr lang="fr-FR" dirty="0" err="1"/>
+              <a:t>P</a:t>
+            </a:r>
+            <a:r>
+              <a:rPr lang="fr-FR" dirty="0" err="1" smtClean="0"/>
+              <a:t>log</a:t>
+            </a:r>
+            <a:r>
+              <a:rPr lang="fr-FR" dirty="0" smtClean="0"/>
+              <a:t> = log10(P) = ln(P)/ln(10)</a:t>
+            </a:r>
+          </a:p>
+          <a:p>
+            <a:r>
+              <a:rPr lang="fr-FR" dirty="0" smtClean="0"/>
+              <a:t>P = </a:t>
+            </a:r>
+            <a:r>
+              <a:rPr lang="fr-FR" dirty="0" err="1" smtClean="0"/>
+              <a:t>exp</a:t>
+            </a:r>
+            <a:r>
+              <a:rPr lang="fr-FR" dirty="0" smtClean="0"/>
+              <a:t>(</a:t>
+            </a:r>
+            <a:r>
+              <a:rPr lang="fr-FR" dirty="0" err="1" smtClean="0"/>
+              <a:t>Plog</a:t>
+            </a:r>
+            <a:r>
+              <a:rPr lang="fr-FR" smtClean="0"/>
+              <a:t> * ln(10))</a:t>
+            </a:r>
+            <a:endParaRPr lang="fr-FR" dirty="0"/>
+          </a:p>
+        </p:txBody>
+      </p:sp>
+    </p:spTree>
+    <p:extLst>
+      <p:ext uri="{BB962C8B-B14F-4D97-AF65-F5344CB8AC3E}">
+        <p14:creationId xmlns:p14="http://schemas.microsoft.com/office/powerpoint/2010/main" val="706216392"/>
+      </p:ext>
+    </p:extLst>
+  </p:cSld>
+  <p:clrMapOvr>
+    <a:masterClrMapping/>
+  </p:clrMapOvr>
+</p:sld>
+</file>
+
 <file path=ppt/slides/slide4.xml><?xml version="1.0" encoding="utf-8"?>
 <p:sld xmlns:a="http://schemas.openxmlformats.org/drawingml/2006/main" xmlns:r="http://schemas.openxmlformats.org/officeDocument/2006/relationships" xmlns:p="http://schemas.openxmlformats.org/presentationml/2006/main">
   <p:cSld>

</xml_diff>